<commit_message>
More minor formatting fixes
Signed-off-by: Gernot Heiser <gernot@unsw.edu.au>
</commit_message>
<xml_diff>
--- a/2011-summit-platform.pptx
+++ b/2011-summit-platform.pptx
@@ -1071,9 +1071,10 @@
           <a:lstStyle/>
           <a:p>
             <a:r>
-              <a:rPr lang="en-US" dirty="0"/>
-              <a:t>FOOTER 1</a:t>
-            </a:r>
+              <a:rPr lang="en-AU"/>
+              <a:t>seL4 Summit, Nov'20</a:t>
+            </a:r>
+            <a:endParaRPr lang="en-US" dirty="0"/>
           </a:p>
         </p:txBody>
       </p:sp>
@@ -1093,9 +1094,10 @@
           <a:lstStyle/>
           <a:p>
             <a:r>
-              <a:rPr lang="en-US" dirty="0"/>
-              <a:t>FOOTER 2</a:t>
-            </a:r>
+              <a:rPr lang="en-US"/>
+              <a:t>Ben Leslie &amp; Gernot Heiser: The seL4 Core Platform</a:t>
+            </a:r>
+            <a:endParaRPr lang="en-US" dirty="0"/>
           </a:p>
         </p:txBody>
       </p:sp>
@@ -1291,9 +1293,10 @@
           <a:lstStyle/>
           <a:p>
             <a:r>
-              <a:rPr lang="en-US" dirty="0"/>
-              <a:t>FOOTER 1</a:t>
-            </a:r>
+              <a:rPr lang="en-AU"/>
+              <a:t>seL4 Summit, Nov'20</a:t>
+            </a:r>
+            <a:endParaRPr lang="en-US" dirty="0"/>
           </a:p>
         </p:txBody>
       </p:sp>
@@ -1313,9 +1316,10 @@
           <a:lstStyle/>
           <a:p>
             <a:r>
-              <a:rPr lang="en-US" dirty="0"/>
-              <a:t>FOOTER 2</a:t>
-            </a:r>
+              <a:rPr lang="en-US"/>
+              <a:t>Ben Leslie &amp; Gernot Heiser: The seL4 Core Platform</a:t>
+            </a:r>
+            <a:endParaRPr lang="en-US" dirty="0"/>
           </a:p>
         </p:txBody>
       </p:sp>
@@ -1423,9 +1427,10 @@
           <a:lstStyle/>
           <a:p>
             <a:r>
-              <a:rPr lang="en-US" dirty="0"/>
-              <a:t>FOOTER 1</a:t>
-            </a:r>
+              <a:rPr lang="en-AU"/>
+              <a:t>seL4 Summit, Nov'20</a:t>
+            </a:r>
+            <a:endParaRPr lang="en-US" dirty="0"/>
           </a:p>
         </p:txBody>
       </p:sp>
@@ -1451,9 +1456,10 @@
           <a:lstStyle/>
           <a:p>
             <a:r>
-              <a:rPr lang="en-US" dirty="0"/>
-              <a:t>FOOTER 2</a:t>
-            </a:r>
+              <a:rPr lang="en-US"/>
+              <a:t>Ben Leslie &amp; Gernot Heiser: The seL4 Core Platform</a:t>
+            </a:r>
+            <a:endParaRPr lang="en-US" dirty="0"/>
           </a:p>
         </p:txBody>
       </p:sp>
@@ -1621,9 +1627,10 @@
           <a:lstStyle/>
           <a:p>
             <a:r>
-              <a:rPr lang="en-US" dirty="0"/>
-              <a:t>FOOTER 1</a:t>
-            </a:r>
+              <a:rPr lang="en-AU"/>
+              <a:t>seL4 Summit, Nov'20</a:t>
+            </a:r>
+            <a:endParaRPr lang="en-US" dirty="0"/>
           </a:p>
         </p:txBody>
       </p:sp>
@@ -1643,9 +1650,10 @@
           <a:lstStyle/>
           <a:p>
             <a:r>
-              <a:rPr lang="en-US" dirty="0"/>
-              <a:t>FOOTER 2</a:t>
-            </a:r>
+              <a:rPr lang="en-US"/>
+              <a:t>Ben Leslie &amp; Gernot Heiser: The seL4 Core Platform</a:t>
+            </a:r>
+            <a:endParaRPr lang="en-US" dirty="0"/>
           </a:p>
         </p:txBody>
       </p:sp>
@@ -1939,8 +1947,8 @@
           </a:lstStyle>
           <a:p>
             <a:r>
-              <a:rPr lang="en-US"/>
-              <a:t>FOOTER 1</a:t>
+              <a:rPr lang="en-AU"/>
+              <a:t>seL4 Summit, Nov'20</a:t>
             </a:r>
             <a:endParaRPr lang="en-US" dirty="0"/>
           </a:p>
@@ -1973,7 +1981,7 @@
           <a:p>
             <a:r>
               <a:rPr lang="en-US"/>
-              <a:t>FOOTER 2</a:t>
+              <a:t>Ben Leslie &amp; Gernot Heiser: The seL4 Core Platform</a:t>
             </a:r>
             <a:endParaRPr lang="en-US" dirty="0"/>
           </a:p>
@@ -2196,9 +2204,10 @@
           <a:lstStyle/>
           <a:p>
             <a:r>
-              <a:rPr lang="en-US" dirty="0"/>
-              <a:t>FOOTER 1</a:t>
-            </a:r>
+              <a:rPr lang="en-AU"/>
+              <a:t>seL4 Summit, Nov'20</a:t>
+            </a:r>
+            <a:endParaRPr lang="en-US" dirty="0"/>
           </a:p>
         </p:txBody>
       </p:sp>
@@ -2218,9 +2227,10 @@
           <a:lstStyle/>
           <a:p>
             <a:r>
-              <a:rPr lang="en-US" dirty="0"/>
-              <a:t>FOOTER 2</a:t>
-            </a:r>
+              <a:rPr lang="en-US"/>
+              <a:t>Ben Leslie &amp; Gernot Heiser: The seL4 Core Platform</a:t>
+            </a:r>
+            <a:endParaRPr lang="en-US" dirty="0"/>
           </a:p>
         </p:txBody>
       </p:sp>
@@ -2660,8 +2670,8 @@
           </a:lstStyle>
           <a:p>
             <a:r>
-              <a:rPr lang="en-US"/>
-              <a:t>FOOTER 1</a:t>
+              <a:rPr lang="en-AU"/>
+              <a:t>seL4 Summit, Nov'20</a:t>
             </a:r>
             <a:endParaRPr lang="en-US" dirty="0"/>
           </a:p>
@@ -2692,7 +2702,7 @@
           <a:p>
             <a:r>
               <a:rPr lang="en-US"/>
-              <a:t>FOOTER 2</a:t>
+              <a:t>Ben Leslie &amp; Gernot Heiser: The seL4 Core Platform</a:t>
             </a:r>
             <a:endParaRPr lang="en-US" dirty="0"/>
           </a:p>
@@ -2815,9 +2825,10 @@
           </a:lstStyle>
           <a:p>
             <a:r>
-              <a:rPr lang="en-US" dirty="0"/>
-              <a:t>Footer 1	</a:t>
-            </a:r>
+              <a:rPr lang="en-AU"/>
+              <a:t>seL4 Summit, Nov'20</a:t>
+            </a:r>
+            <a:endParaRPr lang="en-US" dirty="0"/>
           </a:p>
         </p:txBody>
       </p:sp>
@@ -2845,9 +2856,10 @@
           </a:lstStyle>
           <a:p>
             <a:r>
-              <a:rPr lang="en-US" dirty="0"/>
-              <a:t>Footer 2</a:t>
-            </a:r>
+              <a:rPr lang="en-US"/>
+              <a:t>Ben Leslie &amp; Gernot Heiser: The seL4 Core Platform</a:t>
+            </a:r>
+            <a:endParaRPr lang="en-US" dirty="0"/>
           </a:p>
         </p:txBody>
       </p:sp>
@@ -2975,8 +2987,8 @@
           </a:lstStyle>
           <a:p>
             <a:r>
-              <a:rPr lang="en-US"/>
-              <a:t>FOOTER 1</a:t>
+              <a:rPr lang="en-AU"/>
+              <a:t>seL4 Summit, Nov'20</a:t>
             </a:r>
             <a:endParaRPr lang="en-US" dirty="0"/>
           </a:p>
@@ -3007,7 +3019,7 @@
           <a:p>
             <a:r>
               <a:rPr lang="en-US"/>
-              <a:t>FOOTER 2</a:t>
+              <a:t>Ben Leslie &amp; Gernot Heiser: The seL4 Core Platform</a:t>
             </a:r>
             <a:endParaRPr lang="en-US" dirty="0"/>
           </a:p>
@@ -3377,8 +3389,8 @@
           </a:lstStyle>
           <a:p>
             <a:r>
-              <a:rPr lang="en-US"/>
-              <a:t>FOOTER 1</a:t>
+              <a:rPr lang="en-AU"/>
+              <a:t>seL4 Summit, Nov'20</a:t>
             </a:r>
             <a:endParaRPr lang="en-US" dirty="0"/>
           </a:p>
@@ -3414,7 +3426,7 @@
           <a:p>
             <a:r>
               <a:rPr lang="en-US"/>
-              <a:t>FOOTER 2</a:t>
+              <a:t>Ben Leslie &amp; Gernot Heiser: The seL4 Core Platform</a:t>
             </a:r>
             <a:endParaRPr lang="en-US" dirty="0"/>
           </a:p>
@@ -3756,9 +3768,10 @@
           <a:lstStyle/>
           <a:p>
             <a:r>
-              <a:rPr lang="en-US" dirty="0"/>
-              <a:t>FOOTER 1</a:t>
-            </a:r>
+              <a:rPr lang="en-AU"/>
+              <a:t>seL4 Summit, Nov'20</a:t>
+            </a:r>
+            <a:endParaRPr lang="en-US" dirty="0"/>
           </a:p>
         </p:txBody>
       </p:sp>
@@ -3778,9 +3791,10 @@
           <a:lstStyle/>
           <a:p>
             <a:r>
-              <a:rPr lang="en-US" dirty="0"/>
-              <a:t>FOOTER 2</a:t>
-            </a:r>
+              <a:rPr lang="en-US"/>
+              <a:t>Ben Leslie &amp; Gernot Heiser: The seL4 Core Platform</a:t>
+            </a:r>
+            <a:endParaRPr lang="en-US" dirty="0"/>
           </a:p>
         </p:txBody>
       </p:sp>
@@ -4064,8 +4078,8 @@
           </a:lstStyle>
           <a:p>
             <a:r>
-              <a:rPr lang="en-US"/>
-              <a:t>FOOTER 1</a:t>
+              <a:rPr lang="en-AU"/>
+              <a:t>seL4 Summit, Nov'20</a:t>
             </a:r>
             <a:endParaRPr lang="en-US" dirty="0"/>
           </a:p>
@@ -4106,7 +4120,7 @@
           <a:p>
             <a:r>
               <a:rPr lang="en-US"/>
-              <a:t>FOOTER 2</a:t>
+              <a:t>Ben Leslie &amp; Gernot Heiser: The seL4 Core Platform</a:t>
             </a:r>
             <a:endParaRPr lang="en-US" dirty="0"/>
           </a:p>
@@ -11604,6 +11618,267 @@
                                           </p:stCondLst>
                                         </p:cTn>
                                         <p:tgtEl>
+                                          <p:spTgt spid="7"/>
+                                        </p:tgtEl>
+                                        <p:attrNameLst>
+                                          <p:attrName>style.visibility</p:attrName>
+                                        </p:attrNameLst>
+                                      </p:cBhvr>
+                                      <p:to>
+                                        <p:strVal val="visible"/>
+                                      </p:to>
+                                    </p:set>
+                                  </p:childTnLst>
+                                </p:cTn>
+                              </p:par>
+                              <p:par>
+                                <p:cTn id="7" presetID="1" presetClass="entr" presetSubtype="0" fill="hold" grpId="0" nodeType="withEffect">
+                                  <p:stCondLst>
+                                    <p:cond delay="0"/>
+                                  </p:stCondLst>
+                                  <p:childTnLst>
+                                    <p:set>
+                                      <p:cBhvr>
+                                        <p:cTn id="8" dur="1" fill="hold">
+                                          <p:stCondLst>
+                                            <p:cond delay="0"/>
+                                          </p:stCondLst>
+                                        </p:cTn>
+                                        <p:tgtEl>
+                                          <p:spTgt spid="6"/>
+                                        </p:tgtEl>
+                                        <p:attrNameLst>
+                                          <p:attrName>style.visibility</p:attrName>
+                                        </p:attrNameLst>
+                                      </p:cBhvr>
+                                      <p:to>
+                                        <p:strVal val="visible"/>
+                                      </p:to>
+                                    </p:set>
+                                  </p:childTnLst>
+                                </p:cTn>
+                              </p:par>
+                              <p:par>
+                                <p:cTn id="9" presetID="1" presetClass="entr" presetSubtype="0" fill="hold" nodeType="withEffect">
+                                  <p:stCondLst>
+                                    <p:cond delay="0"/>
+                                  </p:stCondLst>
+                                  <p:childTnLst>
+                                    <p:set>
+                                      <p:cBhvr>
+                                        <p:cTn id="10" dur="1" fill="hold">
+                                          <p:stCondLst>
+                                            <p:cond delay="0"/>
+                                          </p:stCondLst>
+                                        </p:cTn>
+                                        <p:tgtEl>
+                                          <p:spTgt spid="8"/>
+                                        </p:tgtEl>
+                                        <p:attrNameLst>
+                                          <p:attrName>style.visibility</p:attrName>
+                                        </p:attrNameLst>
+                                      </p:cBhvr>
+                                      <p:to>
+                                        <p:strVal val="visible"/>
+                                      </p:to>
+                                    </p:set>
+                                  </p:childTnLst>
+                                </p:cTn>
+                              </p:par>
+                              <p:par>
+                                <p:cTn id="11" presetID="1" presetClass="entr" presetSubtype="0" fill="hold" grpId="0" nodeType="withEffect">
+                                  <p:stCondLst>
+                                    <p:cond delay="0"/>
+                                  </p:stCondLst>
+                                  <p:childTnLst>
+                                    <p:set>
+                                      <p:cBhvr>
+                                        <p:cTn id="12" dur="1" fill="hold">
+                                          <p:stCondLst>
+                                            <p:cond delay="0"/>
+                                          </p:stCondLst>
+                                        </p:cTn>
+                                        <p:tgtEl>
+                                          <p:spTgt spid="13"/>
+                                        </p:tgtEl>
+                                        <p:attrNameLst>
+                                          <p:attrName>style.visibility</p:attrName>
+                                        </p:attrNameLst>
+                                      </p:cBhvr>
+                                      <p:to>
+                                        <p:strVal val="visible"/>
+                                      </p:to>
+                                    </p:set>
+                                  </p:childTnLst>
+                                </p:cTn>
+                              </p:par>
+                              <p:par>
+                                <p:cTn id="13" presetID="1" presetClass="entr" presetSubtype="0" fill="hold" grpId="0" nodeType="withEffect">
+                                  <p:stCondLst>
+                                    <p:cond delay="0"/>
+                                  </p:stCondLst>
+                                  <p:childTnLst>
+                                    <p:set>
+                                      <p:cBhvr>
+                                        <p:cTn id="14" dur="1" fill="hold">
+                                          <p:stCondLst>
+                                            <p:cond delay="0"/>
+                                          </p:stCondLst>
+                                        </p:cTn>
+                                        <p:tgtEl>
+                                          <p:spTgt spid="46"/>
+                                        </p:tgtEl>
+                                        <p:attrNameLst>
+                                          <p:attrName>style.visibility</p:attrName>
+                                        </p:attrNameLst>
+                                      </p:cBhvr>
+                                      <p:to>
+                                        <p:strVal val="visible"/>
+                                      </p:to>
+                                    </p:set>
+                                  </p:childTnLst>
+                                </p:cTn>
+                              </p:par>
+                              <p:par>
+                                <p:cTn id="15" presetID="1" presetClass="entr" presetSubtype="0" fill="hold" nodeType="withEffect">
+                                  <p:stCondLst>
+                                    <p:cond delay="0"/>
+                                  </p:stCondLst>
+                                  <p:childTnLst>
+                                    <p:set>
+                                      <p:cBhvr>
+                                        <p:cTn id="16" dur="1" fill="hold">
+                                          <p:stCondLst>
+                                            <p:cond delay="0"/>
+                                          </p:stCondLst>
+                                        </p:cTn>
+                                        <p:tgtEl>
+                                          <p:spTgt spid="10"/>
+                                        </p:tgtEl>
+                                        <p:attrNameLst>
+                                          <p:attrName>style.visibility</p:attrName>
+                                        </p:attrNameLst>
+                                      </p:cBhvr>
+                                      <p:to>
+                                        <p:strVal val="visible"/>
+                                      </p:to>
+                                    </p:set>
+                                  </p:childTnLst>
+                                </p:cTn>
+                              </p:par>
+                              <p:par>
+                                <p:cTn id="17" presetID="1" presetClass="entr" presetSubtype="0" fill="hold" nodeType="withEffect">
+                                  <p:stCondLst>
+                                    <p:cond delay="0"/>
+                                  </p:stCondLst>
+                                  <p:childTnLst>
+                                    <p:set>
+                                      <p:cBhvr>
+                                        <p:cTn id="18" dur="1" fill="hold">
+                                          <p:stCondLst>
+                                            <p:cond delay="0"/>
+                                          </p:stCondLst>
+                                        </p:cTn>
+                                        <p:tgtEl>
+                                          <p:spTgt spid="77"/>
+                                        </p:tgtEl>
+                                        <p:attrNameLst>
+                                          <p:attrName>style.visibility</p:attrName>
+                                        </p:attrNameLst>
+                                      </p:cBhvr>
+                                      <p:to>
+                                        <p:strVal val="visible"/>
+                                      </p:to>
+                                    </p:set>
+                                  </p:childTnLst>
+                                </p:cTn>
+                              </p:par>
+                              <p:par>
+                                <p:cTn id="19" presetID="1" presetClass="entr" presetSubtype="0" fill="hold" nodeType="withEffect">
+                                  <p:stCondLst>
+                                    <p:cond delay="0"/>
+                                  </p:stCondLst>
+                                  <p:childTnLst>
+                                    <p:set>
+                                      <p:cBhvr>
+                                        <p:cTn id="20" dur="1" fill="hold">
+                                          <p:stCondLst>
+                                            <p:cond delay="0"/>
+                                          </p:stCondLst>
+                                        </p:cTn>
+                                        <p:tgtEl>
+                                          <p:spTgt spid="91"/>
+                                        </p:tgtEl>
+                                        <p:attrNameLst>
+                                          <p:attrName>style.visibility</p:attrName>
+                                        </p:attrNameLst>
+                                      </p:cBhvr>
+                                      <p:to>
+                                        <p:strVal val="visible"/>
+                                      </p:to>
+                                    </p:set>
+                                  </p:childTnLst>
+                                </p:cTn>
+                              </p:par>
+                              <p:par>
+                                <p:cTn id="21" presetID="1" presetClass="entr" presetSubtype="0" fill="hold" nodeType="withEffect">
+                                  <p:stCondLst>
+                                    <p:cond delay="0"/>
+                                  </p:stCondLst>
+                                  <p:childTnLst>
+                                    <p:set>
+                                      <p:cBhvr>
+                                        <p:cTn id="22" dur="1" fill="hold">
+                                          <p:stCondLst>
+                                            <p:cond delay="0"/>
+                                          </p:stCondLst>
+                                        </p:cTn>
+                                        <p:tgtEl>
+                                          <p:spTgt spid="93"/>
+                                        </p:tgtEl>
+                                        <p:attrNameLst>
+                                          <p:attrName>style.visibility</p:attrName>
+                                        </p:attrNameLst>
+                                      </p:cBhvr>
+                                      <p:to>
+                                        <p:strVal val="visible"/>
+                                      </p:to>
+                                    </p:set>
+                                  </p:childTnLst>
+                                </p:cTn>
+                              </p:par>
+                            </p:childTnLst>
+                          </p:cTn>
+                        </p:par>
+                      </p:childTnLst>
+                    </p:cTn>
+                  </p:par>
+                  <p:par>
+                    <p:cTn id="23" fill="hold">
+                      <p:stCondLst>
+                        <p:cond delay="indefinite"/>
+                      </p:stCondLst>
+                      <p:childTnLst>
+                        <p:par>
+                          <p:cTn id="24" fill="hold">
+                            <p:stCondLst>
+                              <p:cond delay="0"/>
+                            </p:stCondLst>
+                            <p:childTnLst>
+                              <p:par>
+                                <p:cTn id="25" presetID="1" presetClass="entr" presetSubtype="0" fill="hold" grpId="0" nodeType="clickEffect">
+                                  <p:stCondLst>
+                                    <p:cond delay="0"/>
+                                  </p:stCondLst>
+                                  <p:childTnLst>
+                                    <p:set>
+                                      <p:cBhvr>
+                                        <p:cTn id="26" dur="1" fill="hold">
+                                          <p:stCondLst>
+                                            <p:cond delay="0"/>
+                                          </p:stCondLst>
+                                        </p:cTn>
+                                        <p:tgtEl>
                                           <p:spTgt spid="92"/>
                                         </p:tgtEl>
                                         <p:attrNameLst>
@@ -11624,26 +11899,26 @@
                     </p:cTn>
                   </p:par>
                   <p:par>
-                    <p:cTn id="7" fill="hold">
+                    <p:cTn id="27" fill="hold">
                       <p:stCondLst>
                         <p:cond delay="indefinite"/>
                       </p:stCondLst>
                       <p:childTnLst>
                         <p:par>
-                          <p:cTn id="8" fill="hold">
+                          <p:cTn id="28" fill="hold">
                             <p:stCondLst>
                               <p:cond delay="0"/>
                             </p:stCondLst>
                             <p:childTnLst>
                               <p:par>
-                                <p:cTn id="9" presetID="1" presetClass="entr" presetSubtype="0" fill="hold" grpId="0" nodeType="clickEffect">
+                                <p:cTn id="29" presetID="1" presetClass="entr" presetSubtype="0" fill="hold" grpId="0" nodeType="clickEffect">
                                   <p:stCondLst>
                                     <p:cond delay="0"/>
                                   </p:stCondLst>
                                   <p:childTnLst>
                                     <p:set>
                                       <p:cBhvr>
-                                        <p:cTn id="10" dur="1" fill="hold">
+                                        <p:cTn id="30" dur="1" fill="hold">
                                           <p:stCondLst>
                                             <p:cond delay="0"/>
                                           </p:stCondLst>
@@ -11690,6 +11965,10 @@
       </p:par>
     </p:tnLst>
     <p:bldLst>
+      <p:bldP spid="7" grpId="0" animBg="1"/>
+      <p:bldP spid="6" grpId="0" animBg="1"/>
+      <p:bldP spid="13" grpId="0"/>
+      <p:bldP spid="46" grpId="0" animBg="1"/>
       <p:bldP spid="92" grpId="0" animBg="1"/>
       <p:bldP spid="94" grpId="0" animBg="1"/>
     </p:bldLst>
@@ -13029,7 +13308,7 @@
                 <a:latin typeface="Roboto" panose="02000000000000000000" pitchFamily="2" charset="0"/>
                 <a:ea typeface="Roboto" panose="02000000000000000000" pitchFamily="2" charset="0"/>
               </a:rPr>
-              <a:t>PPC arguments may reference locations in the CC’s MO (using reference wrappers)</a:t>
+              <a:t>PPC arguments may reference locations in the CC’s MR (using reference wrappers)</a:t>
             </a:r>
           </a:p>
           <a:p>
@@ -16316,9 +16595,10 @@
           <a:lstStyle/>
           <a:p>
             <a:r>
-              <a:rPr lang="en-US" dirty="0"/>
-              <a:t>FOOTER 1</a:t>
-            </a:r>
+              <a:rPr lang="en-AU"/>
+              <a:t>seL4 Summit, Nov'20</a:t>
+            </a:r>
+            <a:endParaRPr lang="en-US" dirty="0"/>
           </a:p>
         </p:txBody>
       </p:sp>
@@ -16344,9 +16624,10 @@
           <a:lstStyle/>
           <a:p>
             <a:r>
-              <a:rPr lang="en-US" dirty="0"/>
-              <a:t>FOOTER 2</a:t>
-            </a:r>
+              <a:rPr lang="en-US"/>
+              <a:t>Ben Leslie &amp; Gernot Heiser: The seL4 Core Platform</a:t>
+            </a:r>
+            <a:endParaRPr lang="en-US" dirty="0"/>
           </a:p>
         </p:txBody>
       </p:sp>
@@ -18820,10 +19101,10 @@
       </p:sp>
       <p:sp>
         <p:nvSpPr>
-          <p:cNvPr id="3" name="Text Placeholder 2">
+          <p:cNvPr id="7" name="Text Placeholder 6">
             <a:extLst>
               <a:ext uri="{FF2B5EF4-FFF2-40B4-BE49-F238E27FC236}">
-                <a16:creationId xmlns:a16="http://schemas.microsoft.com/office/drawing/2014/main" id="{2308D29F-1A87-C34B-A95A-544F343DB17B}"/>
+                <a16:creationId xmlns:a16="http://schemas.microsoft.com/office/drawing/2014/main" id="{333BA01C-5871-3A4F-822A-691110665088}"/>
               </a:ext>
             </a:extLst>
           </p:cNvPr>
@@ -18839,7 +19120,7 @@
           <a:bodyPr/>
           <a:lstStyle/>
           <a:p>
-            <a:endParaRPr lang="en-US" dirty="0"/>
+            <a:endParaRPr lang="en-AU"/>
           </a:p>
         </p:txBody>
       </p:sp>
@@ -18865,8 +19146,8 @@
           <a:lstStyle/>
           <a:p>
             <a:r>
-              <a:rPr lang="en-US"/>
-              <a:t>FOOTER 1</a:t>
+              <a:rPr lang="en-AU"/>
+              <a:t>seL4 Summit, Nov'20</a:t>
             </a:r>
             <a:endParaRPr lang="en-US" dirty="0"/>
           </a:p>
@@ -18895,7 +19176,7 @@
           <a:p>
             <a:r>
               <a:rPr lang="en-US"/>
-              <a:t>FOOTER 2</a:t>
+              <a:t>Ben Leslie &amp; Gernot Heiser: The seL4 Core Platform</a:t>
             </a:r>
             <a:endParaRPr lang="en-US" dirty="0"/>
           </a:p>

</xml_diff>

<commit_message>
Talk as presented to TS today
Signed-off-by: Gernot Heiser <gernot@unsw.edu.au>
</commit_message>
<xml_diff>
--- a/2011-summit-platform.pptx
+++ b/2011-summit-platform.pptx
@@ -229,7 +229,7 @@
           <a:p>
             <a:fld id="{AC08A8E5-C46F-864F-8B81-087FC58D5E60}" type="datetimeFigureOut">
               <a:rPr lang="en-US" smtClean="0"/>
-              <a:t>11/21/20</a:t>
+              <a:t>11/23/20</a:t>
             </a:fld>
             <a:endParaRPr lang="en-US"/>
           </a:p>
@@ -406,7 +406,7 @@
           <a:p>
             <a:fld id="{654D4E97-2B51-2F45-9406-7216492572EC}" type="datetimeFigureOut">
               <a:rPr lang="en-US" smtClean="0"/>
-              <a:t>11/21/20</a:t>
+              <a:t>11/23/20</a:t>
             </a:fld>
             <a:endParaRPr lang="en-US"/>
           </a:p>
@@ -672,6 +672,90 @@
     </a:lvl9pPr>
   </p:notesStyle>
 </p:notesMaster>
+</file>
+
+<file path=ppt/notesSlides/notesSlide1.xml><?xml version="1.0" encoding="utf-8"?>
+<p:notes xmlns:a="http://schemas.openxmlformats.org/drawingml/2006/main" xmlns:r="http://schemas.openxmlformats.org/officeDocument/2006/relationships" xmlns:p="http://schemas.openxmlformats.org/presentationml/2006/main">
+  <p:cSld>
+    <p:spTree>
+      <p:nvGrpSpPr>
+        <p:cNvPr id="1" name=""/>
+        <p:cNvGrpSpPr/>
+        <p:nvPr/>
+      </p:nvGrpSpPr>
+      <p:grpSpPr>
+        <a:xfrm>
+          <a:off x="0" y="0"/>
+          <a:ext cx="0" cy="0"/>
+          <a:chOff x="0" y="0"/>
+          <a:chExt cx="0" cy="0"/>
+        </a:xfrm>
+      </p:grpSpPr>
+      <p:sp>
+        <p:nvSpPr>
+          <p:cNvPr id="2" name="Slide Image Placeholder 1"/>
+          <p:cNvSpPr>
+            <a:spLocks noGrp="1" noRot="1" noChangeAspect="1"/>
+          </p:cNvSpPr>
+          <p:nvPr>
+            <p:ph type="sldImg"/>
+          </p:nvPr>
+        </p:nvSpPr>
+        <p:spPr/>
+      </p:sp>
+      <p:sp>
+        <p:nvSpPr>
+          <p:cNvPr id="3" name="Notes Placeholder 2"/>
+          <p:cNvSpPr>
+            <a:spLocks noGrp="1"/>
+          </p:cNvSpPr>
+          <p:nvPr>
+            <p:ph type="body" idx="1"/>
+          </p:nvPr>
+        </p:nvSpPr>
+        <p:spPr/>
+        <p:txBody>
+          <a:bodyPr/>
+          <a:lstStyle/>
+          <a:p>
+            <a:endParaRPr lang="en-AU" dirty="0"/>
+          </a:p>
+        </p:txBody>
+      </p:sp>
+      <p:sp>
+        <p:nvSpPr>
+          <p:cNvPr id="4" name="Slide Number Placeholder 3"/>
+          <p:cNvSpPr>
+            <a:spLocks noGrp="1"/>
+          </p:cNvSpPr>
+          <p:nvPr>
+            <p:ph type="sldNum" sz="quarter" idx="5"/>
+          </p:nvPr>
+        </p:nvSpPr>
+        <p:spPr/>
+        <p:txBody>
+          <a:bodyPr/>
+          <a:lstStyle/>
+          <a:p>
+            <a:fld id="{D3B45D6E-762A-E148-986B-034774A19760}" type="slidenum">
+              <a:rPr lang="en-US" smtClean="0"/>
+              <a:t>1</a:t>
+            </a:fld>
+            <a:endParaRPr lang="en-US"/>
+          </a:p>
+        </p:txBody>
+      </p:sp>
+    </p:spTree>
+    <p:extLst>
+      <p:ext uri="{BB962C8B-B14F-4D97-AF65-F5344CB8AC3E}">
+        <p14:creationId xmlns:p14="http://schemas.microsoft.com/office/powerpoint/2010/main" val="552439637"/>
+      </p:ext>
+    </p:extLst>
+  </p:cSld>
+  <p:clrMapOvr>
+    <a:masterClrMapping/>
+  </p:clrMapOvr>
+</p:notes>
 </file>
 
 <file path=ppt/slideLayouts/slideLayout1.xml><?xml version="1.0" encoding="utf-8"?>
@@ -4107,7 +4191,7 @@
           <a:bodyPr vert="horz" lIns="91440" tIns="45720" rIns="91440" bIns="45720" rtlCol="0" anchor="ctr"/>
           <a:lstStyle>
             <a:lvl1pPr algn="ctr">
-              <a:defRPr sz="900" cap="all" baseline="0">
+              <a:defRPr sz="900" cap="none" baseline="0">
                 <a:solidFill>
                   <a:schemeClr val="tx1"/>
                 </a:solidFill>
@@ -4118,10 +4202,33 @@
           </a:lstStyle>
           <a:p>
             <a:r>
-              <a:rPr lang="en-US"/>
-              <a:t>Ben Leslie &amp; Gernot Heiser: The seL4 Core Platform</a:t>
-            </a:r>
-            <a:endParaRPr lang="en-US" dirty="0"/>
+              <a:rPr lang="en-US" dirty="0"/>
+              <a:t>Ben </a:t>
+            </a:r>
+            <a:r>
+              <a:rPr lang="en-US" dirty="0" err="1"/>
+              <a:t>leslie</a:t>
+            </a:r>
+            <a:r>
+              <a:rPr lang="en-US" dirty="0"/>
+              <a:t> &amp; </a:t>
+            </a:r>
+            <a:r>
+              <a:rPr lang="en-US" dirty="0" err="1"/>
+              <a:t>gernot</a:t>
+            </a:r>
+            <a:r>
+              <a:rPr lang="en-US" dirty="0"/>
+              <a:t> </a:t>
+            </a:r>
+            <a:r>
+              <a:rPr lang="en-US" dirty="0" err="1"/>
+              <a:t>heiser</a:t>
+            </a:r>
+            <a:r>
+              <a:rPr lang="en-US" dirty="0"/>
+              <a:t>: the sel4 core platform</a:t>
+            </a:r>
           </a:p>
         </p:txBody>
       </p:sp>
@@ -4922,7 +5029,7 @@
                 <a:solidFill>
                   <a:srgbClr val="000000"/>
                 </a:solidFill>
-                <a:hlinkClick r:id="rId2">
+                <a:hlinkClick r:id="rId3">
                   <a:extLst>
                     <a:ext uri="{A12FA001-AC4F-418D-AE19-62706E023703}">
                       <ahyp:hlinkClr xmlns:ahyp="http://schemas.microsoft.com/office/drawing/2018/hyperlinkcolor" val="tx"/>
@@ -10006,9 +10113,10 @@
           <a:p>
             <a:pPr algn="ctr"/>
             <a:r>
-              <a:rPr lang="en-AU" dirty="0"/>
-              <a:t>R</a:t>
-            </a:r>
+              <a:rPr lang="en-AU" dirty="0" err="1"/>
+              <a:t>MyAdventureWithAlice@gmail.com</a:t>
+            </a:r>
+            <a:endParaRPr lang="en-AU" dirty="0"/>
           </a:p>
         </p:txBody>
       </p:sp>
@@ -10641,7 +10749,7 @@
         <p:spPr>
           <a:xfrm>
             <a:off x="3756623" y="3698589"/>
-            <a:ext cx="4525966" cy="1786613"/>
+            <a:ext cx="4525966" cy="2032241"/>
           </a:xfrm>
           <a:prstGeom prst="rect">
             <a:avLst/>
@@ -10803,7 +10911,22 @@
                   <a:schemeClr val="tx1"/>
                 </a:solidFill>
               </a:rPr>
-              <a:t>Remember: PPC runs on client’s SC!</a:t>
+              <a:t>Remember: PPC runs on client’s SC</a:t>
+            </a:r>
+            <a:br>
+              <a:rPr lang="en-AU" dirty="0">
+                <a:solidFill>
+                  <a:schemeClr val="tx1"/>
+                </a:solidFill>
+              </a:rPr>
+            </a:br>
+            <a:r>
+              <a:rPr lang="en-AU" dirty="0">
+                <a:solidFill>
+                  <a:schemeClr val="tx1"/>
+                </a:solidFill>
+              </a:rPr>
+              <a:t>and thus the client’s core!</a:t>
             </a:r>
           </a:p>
           <a:p>
@@ -23954,7 +24077,7 @@
         <p:spPr>
           <a:xfrm>
             <a:off x="8438962" y="3112377"/>
-            <a:ext cx="3080490" cy="923330"/>
+            <a:ext cx="3080490" cy="1206084"/>
           </a:xfrm>
           <a:prstGeom prst="rect">
             <a:avLst/>
@@ -24084,6 +24207,16 @@
                 </a:solidFill>
               </a:rPr>
               <a:t> and SC</a:t>
+            </a:r>
+          </a:p>
+          <a:p>
+            <a:r>
+              <a:rPr lang="en-AU" dirty="0">
+                <a:solidFill>
+                  <a:schemeClr val="tx1"/>
+                </a:solidFill>
+              </a:rPr>
+              <a:t>Bound to a Core!</a:t>
             </a:r>
           </a:p>
         </p:txBody>
@@ -24551,8 +24684,8 @@
         </p:nvCxnSpPr>
         <p:spPr>
           <a:xfrm flipH="1">
-            <a:off x="7968268" y="3574042"/>
-            <a:ext cx="470694" cy="888366"/>
+            <a:off x="7968268" y="3715419"/>
+            <a:ext cx="470694" cy="746989"/>
           </a:xfrm>
           <a:prstGeom prst="line">
             <a:avLst/>
@@ -30820,6 +30953,298 @@
           </a:fontRef>
         </p:style>
       </p:cxnSp>
+      <p:sp>
+        <p:nvSpPr>
+          <p:cNvPr id="59" name="TextBox 58">
+            <a:extLst>
+              <a:ext uri="{FF2B5EF4-FFF2-40B4-BE49-F238E27FC236}">
+                <a16:creationId xmlns:a16="http://schemas.microsoft.com/office/drawing/2014/main" id="{C62F97C8-D15C-074D-8C1C-E9700EF2A8C9}"/>
+              </a:ext>
+            </a:extLst>
+          </p:cNvPr>
+          <p:cNvSpPr txBox="1"/>
+          <p:nvPr/>
+        </p:nvSpPr>
+        <p:spPr>
+          <a:xfrm>
+            <a:off x="107790" y="3490552"/>
+            <a:ext cx="2420806" cy="364430"/>
+          </a:xfrm>
+          <a:prstGeom prst="rect">
+            <a:avLst/>
+          </a:prstGeom>
+          <a:ln>
+            <a:noFill/>
+          </a:ln>
+        </p:spPr>
+        <p:style>
+          <a:lnRef idx="2">
+            <a:schemeClr val="accent1">
+              <a:shade val="50000"/>
+            </a:schemeClr>
+          </a:lnRef>
+          <a:fillRef idx="1">
+            <a:schemeClr val="accent1"/>
+          </a:fillRef>
+          <a:effectRef idx="0">
+            <a:schemeClr val="accent1"/>
+          </a:effectRef>
+          <a:fontRef idx="minor">
+            <a:schemeClr val="lt1"/>
+          </a:fontRef>
+        </p:style>
+        <p:txBody>
+          <a:bodyPr rtlCol="0" anchor="t"/>
+          <a:lstStyle>
+            <a:defPPr>
+              <a:defRPr lang="en-US"/>
+            </a:defPPr>
+            <a:lvl1pPr marL="285750" indent="-285750">
+              <a:buFont typeface="Arial" panose="020B0604020202020204" pitchFamily="34" charset="0"/>
+              <a:buChar char="•"/>
+              <a:defRPr>
+                <a:latin typeface="Roboto" panose="02000000000000000000" pitchFamily="2" charset="0"/>
+                <a:ea typeface="Roboto" panose="02000000000000000000" pitchFamily="2" charset="0"/>
+              </a:defRPr>
+            </a:lvl1pPr>
+            <a:lvl2pPr>
+              <a:defRPr>
+                <a:solidFill>
+                  <a:schemeClr val="lt1"/>
+                </a:solidFill>
+              </a:defRPr>
+            </a:lvl2pPr>
+            <a:lvl3pPr>
+              <a:defRPr>
+                <a:solidFill>
+                  <a:schemeClr val="lt1"/>
+                </a:solidFill>
+              </a:defRPr>
+            </a:lvl3pPr>
+            <a:lvl4pPr>
+              <a:defRPr>
+                <a:solidFill>
+                  <a:schemeClr val="lt1"/>
+                </a:solidFill>
+              </a:defRPr>
+            </a:lvl4pPr>
+            <a:lvl5pPr>
+              <a:defRPr>
+                <a:solidFill>
+                  <a:schemeClr val="lt1"/>
+                </a:solidFill>
+              </a:defRPr>
+            </a:lvl5pPr>
+            <a:lvl6pPr>
+              <a:defRPr>
+                <a:solidFill>
+                  <a:schemeClr val="lt1"/>
+                </a:solidFill>
+              </a:defRPr>
+            </a:lvl6pPr>
+            <a:lvl7pPr>
+              <a:defRPr>
+                <a:solidFill>
+                  <a:schemeClr val="lt1"/>
+                </a:solidFill>
+              </a:defRPr>
+            </a:lvl7pPr>
+            <a:lvl8pPr>
+              <a:defRPr>
+                <a:solidFill>
+                  <a:schemeClr val="lt1"/>
+                </a:solidFill>
+              </a:defRPr>
+            </a:lvl8pPr>
+            <a:lvl9pPr>
+              <a:defRPr>
+                <a:solidFill>
+                  <a:schemeClr val="lt1"/>
+                </a:solidFill>
+              </a:defRPr>
+            </a:lvl9pPr>
+          </a:lstStyle>
+          <a:p>
+            <a:pPr marL="0" indent="0">
+              <a:buNone/>
+            </a:pPr>
+            <a:r>
+              <a:rPr lang="en-AU" dirty="0">
+                <a:solidFill>
+                  <a:schemeClr val="tx1"/>
+                </a:solidFill>
+              </a:rPr>
+              <a:t>Potentially cross-core</a:t>
+            </a:r>
+          </a:p>
+        </p:txBody>
+      </p:sp>
+      <p:sp>
+        <p:nvSpPr>
+          <p:cNvPr id="60" name="TextBox 59">
+            <a:extLst>
+              <a:ext uri="{FF2B5EF4-FFF2-40B4-BE49-F238E27FC236}">
+                <a16:creationId xmlns:a16="http://schemas.microsoft.com/office/drawing/2014/main" id="{091DE908-85BA-3645-B027-7ABEC52BEB50}"/>
+              </a:ext>
+            </a:extLst>
+          </p:cNvPr>
+          <p:cNvSpPr txBox="1"/>
+          <p:nvPr/>
+        </p:nvSpPr>
+        <p:spPr>
+          <a:xfrm>
+            <a:off x="1510865" y="2851432"/>
+            <a:ext cx="3751156" cy="259074"/>
+          </a:xfrm>
+          <a:prstGeom prst="rect">
+            <a:avLst/>
+          </a:prstGeom>
+          <a:noFill/>
+          <a:ln w="38100"/>
+        </p:spPr>
+        <p:style>
+          <a:lnRef idx="2">
+            <a:schemeClr val="accent1">
+              <a:shade val="50000"/>
+            </a:schemeClr>
+          </a:lnRef>
+          <a:fillRef idx="1">
+            <a:schemeClr val="accent1"/>
+          </a:fillRef>
+          <a:effectRef idx="0">
+            <a:schemeClr val="accent1"/>
+          </a:effectRef>
+          <a:fontRef idx="minor">
+            <a:schemeClr val="lt1"/>
+          </a:fontRef>
+        </p:style>
+        <p:txBody>
+          <a:bodyPr rtlCol="0" anchor="t"/>
+          <a:lstStyle>
+            <a:defPPr>
+              <a:defRPr lang="en-US"/>
+            </a:defPPr>
+            <a:lvl1pPr marL="285750" indent="-285750">
+              <a:buFont typeface="Arial" panose="020B0604020202020204" pitchFamily="34" charset="0"/>
+              <a:buChar char="•"/>
+              <a:defRPr>
+                <a:latin typeface="Roboto" panose="02000000000000000000" pitchFamily="2" charset="0"/>
+                <a:ea typeface="Roboto" panose="02000000000000000000" pitchFamily="2" charset="0"/>
+              </a:defRPr>
+            </a:lvl1pPr>
+            <a:lvl2pPr>
+              <a:defRPr>
+                <a:solidFill>
+                  <a:schemeClr val="lt1"/>
+                </a:solidFill>
+              </a:defRPr>
+            </a:lvl2pPr>
+            <a:lvl3pPr>
+              <a:defRPr>
+                <a:solidFill>
+                  <a:schemeClr val="lt1"/>
+                </a:solidFill>
+              </a:defRPr>
+            </a:lvl3pPr>
+            <a:lvl4pPr>
+              <a:defRPr>
+                <a:solidFill>
+                  <a:schemeClr val="lt1"/>
+                </a:solidFill>
+              </a:defRPr>
+            </a:lvl4pPr>
+            <a:lvl5pPr>
+              <a:defRPr>
+                <a:solidFill>
+                  <a:schemeClr val="lt1"/>
+                </a:solidFill>
+              </a:defRPr>
+            </a:lvl5pPr>
+            <a:lvl6pPr>
+              <a:defRPr>
+                <a:solidFill>
+                  <a:schemeClr val="lt1"/>
+                </a:solidFill>
+              </a:defRPr>
+            </a:lvl6pPr>
+            <a:lvl7pPr>
+              <a:defRPr>
+                <a:solidFill>
+                  <a:schemeClr val="lt1"/>
+                </a:solidFill>
+              </a:defRPr>
+            </a:lvl7pPr>
+            <a:lvl8pPr>
+              <a:defRPr>
+                <a:solidFill>
+                  <a:schemeClr val="lt1"/>
+                </a:solidFill>
+              </a:defRPr>
+            </a:lvl8pPr>
+            <a:lvl9pPr>
+              <a:defRPr>
+                <a:solidFill>
+                  <a:schemeClr val="lt1"/>
+                </a:solidFill>
+              </a:defRPr>
+            </a:lvl9pPr>
+          </a:lstStyle>
+          <a:p>
+            <a:pPr marL="0" indent="0">
+              <a:buNone/>
+            </a:pPr>
+            <a:endParaRPr lang="en-AU" dirty="0">
+              <a:solidFill>
+                <a:schemeClr val="tx1"/>
+              </a:solidFill>
+            </a:endParaRPr>
+          </a:p>
+        </p:txBody>
+      </p:sp>
+      <p:cxnSp>
+        <p:nvCxnSpPr>
+          <p:cNvPr id="61" name="Straight Connector 60">
+            <a:extLst>
+              <a:ext uri="{FF2B5EF4-FFF2-40B4-BE49-F238E27FC236}">
+                <a16:creationId xmlns:a16="http://schemas.microsoft.com/office/drawing/2014/main" id="{1C0ACE63-05DC-4243-A567-5076470431AE}"/>
+              </a:ext>
+            </a:extLst>
+          </p:cNvPr>
+          <p:cNvCxnSpPr>
+            <a:cxnSpLocks/>
+            <a:stCxn id="59" idx="0"/>
+            <a:endCxn id="60" idx="1"/>
+          </p:cNvCxnSpPr>
+          <p:nvPr/>
+        </p:nvCxnSpPr>
+        <p:spPr>
+          <a:xfrm flipV="1">
+            <a:off x="1318193" y="2980969"/>
+            <a:ext cx="192672" cy="509583"/>
+          </a:xfrm>
+          <a:prstGeom prst="line">
+            <a:avLst/>
+          </a:prstGeom>
+          <a:noFill/>
+          <a:ln w="38100"/>
+        </p:spPr>
+        <p:style>
+          <a:lnRef idx="2">
+            <a:schemeClr val="accent1">
+              <a:shade val="50000"/>
+            </a:schemeClr>
+          </a:lnRef>
+          <a:fillRef idx="1">
+            <a:schemeClr val="accent1"/>
+          </a:fillRef>
+          <a:effectRef idx="0">
+            <a:schemeClr val="accent1"/>
+          </a:effectRef>
+          <a:fontRef idx="minor">
+            <a:schemeClr val="lt1"/>
+          </a:fontRef>
+        </p:style>
+      </p:cxnSp>
     </p:spTree>
     <p:extLst>
       <p:ext uri="{BB962C8B-B14F-4D97-AF65-F5344CB8AC3E}">
@@ -31079,6 +31504,131 @@
                                           </p:stCondLst>
                                         </p:cTn>
                                         <p:tgtEl>
+                                          <p:spTgt spid="60"/>
+                                        </p:tgtEl>
+                                        <p:attrNameLst>
+                                          <p:attrName>style.visibility</p:attrName>
+                                        </p:attrNameLst>
+                                      </p:cBhvr>
+                                      <p:to>
+                                        <p:strVal val="visible"/>
+                                      </p:to>
+                                    </p:set>
+                                  </p:childTnLst>
+                                </p:cTn>
+                              </p:par>
+                            </p:childTnLst>
+                          </p:cTn>
+                        </p:par>
+                        <p:par>
+                          <p:cTn id="26" fill="hold">
+                            <p:stCondLst>
+                              <p:cond delay="0"/>
+                            </p:stCondLst>
+                            <p:childTnLst>
+                              <p:par>
+                                <p:cTn id="27" presetID="22" presetClass="entr" presetSubtype="1" fill="hold" nodeType="afterEffect">
+                                  <p:stCondLst>
+                                    <p:cond delay="0"/>
+                                  </p:stCondLst>
+                                  <p:childTnLst>
+                                    <p:set>
+                                      <p:cBhvr>
+                                        <p:cTn id="28" dur="1" fill="hold">
+                                          <p:stCondLst>
+                                            <p:cond delay="0"/>
+                                          </p:stCondLst>
+                                        </p:cTn>
+                                        <p:tgtEl>
+                                          <p:spTgt spid="61"/>
+                                        </p:tgtEl>
+                                        <p:attrNameLst>
+                                          <p:attrName>style.visibility</p:attrName>
+                                        </p:attrNameLst>
+                                      </p:cBhvr>
+                                      <p:to>
+                                        <p:strVal val="visible"/>
+                                      </p:to>
+                                    </p:set>
+                                    <p:animEffect transition="in" filter="wipe(up)">
+                                      <p:cBhvr>
+                                        <p:cTn id="29" dur="500"/>
+                                        <p:tgtEl>
+                                          <p:spTgt spid="61"/>
+                                        </p:tgtEl>
+                                      </p:cBhvr>
+                                    </p:animEffect>
+                                  </p:childTnLst>
+                                </p:cTn>
+                              </p:par>
+                            </p:childTnLst>
+                          </p:cTn>
+                        </p:par>
+                        <p:par>
+                          <p:cTn id="30" fill="hold">
+                            <p:stCondLst>
+                              <p:cond delay="500"/>
+                            </p:stCondLst>
+                            <p:childTnLst>
+                              <p:par>
+                                <p:cTn id="31" presetID="1" presetClass="entr" presetSubtype="0" fill="hold" grpId="0" nodeType="afterEffect">
+                                  <p:stCondLst>
+                                    <p:cond delay="0"/>
+                                  </p:stCondLst>
+                                  <p:childTnLst>
+                                    <p:set>
+                                      <p:cBhvr>
+                                        <p:cTn id="32" dur="1" fill="hold">
+                                          <p:stCondLst>
+                                            <p:cond delay="0"/>
+                                          </p:stCondLst>
+                                        </p:cTn>
+                                        <p:tgtEl>
+                                          <p:spTgt spid="59"/>
+                                        </p:tgtEl>
+                                        <p:attrNameLst>
+                                          <p:attrName>style.visibility</p:attrName>
+                                        </p:attrNameLst>
+                                      </p:cBhvr>
+                                      <p:to>
+                                        <p:strVal val="visible"/>
+                                      </p:to>
+                                    </p:set>
+                                  </p:childTnLst>
+                                </p:cTn>
+                              </p:par>
+                            </p:childTnLst>
+                          </p:cTn>
+                        </p:par>
+                      </p:childTnLst>
+                    </p:cTn>
+                  </p:par>
+                  <p:par>
+                    <p:cTn id="33" fill="hold">
+                      <p:stCondLst>
+                        <p:cond delay="indefinite"/>
+                      </p:stCondLst>
+                      <p:childTnLst>
+                        <p:par>
+                          <p:cTn id="34" fill="hold">
+                            <p:stCondLst>
+                              <p:cond delay="0"/>
+                            </p:stCondLst>
+                            <p:childTnLst>
+                              <p:par>
+                                <p:cTn id="35" presetID="1" presetClass="entr" presetSubtype="0" fill="hold" grpId="0" nodeType="clickEffect">
+                                  <p:stCondLst>
+                                    <p:cond delay="0"/>
+                                  </p:stCondLst>
+                                  <p:childTnLst>
+                                    <p:set>
+                                      <p:cBhvr>
+                                        <p:cTn id="36" dur="1" fill="hold">
+                                          <p:stCondLst>
+                                            <p:cond delay="0"/>
+                                          </p:stCondLst>
+                                        </p:cTn>
+                                        <p:tgtEl>
                                           <p:spTgt spid="50"/>
                                         </p:tgtEl>
                                         <p:attrNameLst>
@@ -31125,6 +31675,8 @@
       <p:bldP spid="50" grpId="0" animBg="1"/>
       <p:bldP spid="56" grpId="0" animBg="1"/>
       <p:bldP spid="57" grpId="0" animBg="1"/>
+      <p:bldP spid="59" grpId="0" animBg="1"/>
+      <p:bldP spid="60" grpId="0" animBg="1"/>
     </p:bldLst>
   </p:timing>
 </p:sld>

</xml_diff>